<commit_message>
new api function update example
</commit_message>
<xml_diff>
--- a/paper/table/Figure1.pptx
+++ b/paper/table/Figure1.pptx
@@ -104,6 +104,11 @@
       </a:defRPr>
     </a:lvl9pPr>
   </p:defaultTextStyle>
+  <p:extLst>
+    <p:ext uri="{EFAFB233-063F-42B5-8137-9DF3F51BA10A}">
+      <p15:sldGuideLst xmlns:p15="http://schemas.microsoft.com/office/powerpoint/2012/main"/>
+    </p:ext>
+  </p:extLst>
 </p:presentation>
 </file>
 
@@ -238,7 +243,7 @@
           <a:p>
             <a:fld id="{9FD8147D-83B2-6D47-9CA2-BA325B80F8F6}" type="datetimeFigureOut">
               <a:rPr lang="en-US" smtClean="0"/>
-              <a:t>11/21/23</a:t>
+              <a:t>1/4/24</a:t>
             </a:fld>
             <a:endParaRPr lang="en-US"/>
           </a:p>
@@ -408,7 +413,7 @@
           <a:p>
             <a:fld id="{9FD8147D-83B2-6D47-9CA2-BA325B80F8F6}" type="datetimeFigureOut">
               <a:rPr lang="en-US" smtClean="0"/>
-              <a:t>11/21/23</a:t>
+              <a:t>1/4/24</a:t>
             </a:fld>
             <a:endParaRPr lang="en-US"/>
           </a:p>
@@ -588,7 +593,7 @@
           <a:p>
             <a:fld id="{9FD8147D-83B2-6D47-9CA2-BA325B80F8F6}" type="datetimeFigureOut">
               <a:rPr lang="en-US" smtClean="0"/>
-              <a:t>11/21/23</a:t>
+              <a:t>1/4/24</a:t>
             </a:fld>
             <a:endParaRPr lang="en-US"/>
           </a:p>
@@ -758,7 +763,7 @@
           <a:p>
             <a:fld id="{9FD8147D-83B2-6D47-9CA2-BA325B80F8F6}" type="datetimeFigureOut">
               <a:rPr lang="en-US" smtClean="0"/>
-              <a:t>11/21/23</a:t>
+              <a:t>1/4/24</a:t>
             </a:fld>
             <a:endParaRPr lang="en-US"/>
           </a:p>
@@ -1002,7 +1007,7 @@
           <a:p>
             <a:fld id="{9FD8147D-83B2-6D47-9CA2-BA325B80F8F6}" type="datetimeFigureOut">
               <a:rPr lang="en-US" smtClean="0"/>
-              <a:t>11/21/23</a:t>
+              <a:t>1/4/24</a:t>
             </a:fld>
             <a:endParaRPr lang="en-US"/>
           </a:p>
@@ -1234,7 +1239,7 @@
           <a:p>
             <a:fld id="{9FD8147D-83B2-6D47-9CA2-BA325B80F8F6}" type="datetimeFigureOut">
               <a:rPr lang="en-US" smtClean="0"/>
-              <a:t>11/21/23</a:t>
+              <a:t>1/4/24</a:t>
             </a:fld>
             <a:endParaRPr lang="en-US"/>
           </a:p>
@@ -1601,7 +1606,7 @@
           <a:p>
             <a:fld id="{9FD8147D-83B2-6D47-9CA2-BA325B80F8F6}" type="datetimeFigureOut">
               <a:rPr lang="en-US" smtClean="0"/>
-              <a:t>11/21/23</a:t>
+              <a:t>1/4/24</a:t>
             </a:fld>
             <a:endParaRPr lang="en-US"/>
           </a:p>
@@ -1719,7 +1724,7 @@
           <a:p>
             <a:fld id="{9FD8147D-83B2-6D47-9CA2-BA325B80F8F6}" type="datetimeFigureOut">
               <a:rPr lang="en-US" smtClean="0"/>
-              <a:t>11/21/23</a:t>
+              <a:t>1/4/24</a:t>
             </a:fld>
             <a:endParaRPr lang="en-US"/>
           </a:p>
@@ -1814,7 +1819,7 @@
           <a:p>
             <a:fld id="{9FD8147D-83B2-6D47-9CA2-BA325B80F8F6}" type="datetimeFigureOut">
               <a:rPr lang="en-US" smtClean="0"/>
-              <a:t>11/21/23</a:t>
+              <a:t>1/4/24</a:t>
             </a:fld>
             <a:endParaRPr lang="en-US"/>
           </a:p>
@@ -2091,7 +2096,7 @@
           <a:p>
             <a:fld id="{9FD8147D-83B2-6D47-9CA2-BA325B80F8F6}" type="datetimeFigureOut">
               <a:rPr lang="en-US" smtClean="0"/>
-              <a:t>11/21/23</a:t>
+              <a:t>1/4/24</a:t>
             </a:fld>
             <a:endParaRPr lang="en-US"/>
           </a:p>
@@ -2348,7 +2353,7 @@
           <a:p>
             <a:fld id="{9FD8147D-83B2-6D47-9CA2-BA325B80F8F6}" type="datetimeFigureOut">
               <a:rPr lang="en-US" smtClean="0"/>
-              <a:t>11/21/23</a:t>
+              <a:t>1/4/24</a:t>
             </a:fld>
             <a:endParaRPr lang="en-US"/>
           </a:p>
@@ -2561,7 +2566,7 @@
           <a:p>
             <a:fld id="{9FD8147D-83B2-6D47-9CA2-BA325B80F8F6}" type="datetimeFigureOut">
               <a:rPr lang="en-US" smtClean="0"/>
-              <a:t>11/21/23</a:t>
+              <a:t>1/4/24</a:t>
             </a:fld>
             <a:endParaRPr lang="en-US"/>
           </a:p>
@@ -3184,10 +3189,10 @@
       </p:pic>
       <p:pic>
         <p:nvPicPr>
-          <p:cNvPr id="11" name="Picture 10">
+          <p:cNvPr id="2" name="Picture 1">
             <a:extLst>
               <a:ext uri="{FF2B5EF4-FFF2-40B4-BE49-F238E27FC236}">
-                <a16:creationId xmlns:a16="http://schemas.microsoft.com/office/drawing/2014/main" id="{AAE70AE3-7781-D20D-EDAF-7069153EEF49}"/>
+                <a16:creationId xmlns:a16="http://schemas.microsoft.com/office/drawing/2014/main" id="{B7EA0F3A-A11C-C4D8-3541-3F7C8926E3B5}"/>
               </a:ext>
             </a:extLst>
           </p:cNvPr>
@@ -3204,8 +3209,8 @@
         </p:blipFill>
         <p:spPr>
           <a:xfrm>
-            <a:off x="119571" y="6816753"/>
-            <a:ext cx="3288956" cy="2002890"/>
+            <a:off x="110981" y="6764867"/>
+            <a:ext cx="3387744" cy="2083043"/>
           </a:xfrm>
           <a:prstGeom prst="rect">
             <a:avLst/>

</xml_diff>